<commit_message>
add references to poster
</commit_message>
<xml_diff>
--- a/poster/PrePoster.pptx
+++ b/poster/PrePoster.pptx
@@ -17560,7 +17560,21 @@
                 <a:latin typeface="Roboto" panose="02000000000000000000" pitchFamily="2" charset="0"/>
                 <a:ea typeface="Roboto" panose="02000000000000000000" pitchFamily="2" charset="0"/>
               </a:rPr>
-              <a:t>data can strongly reduce cost. </a:t>
+              <a:t>data can strongly reduce cost </a:t>
+            </a:r>
+            <a:r>
+              <a:rPr lang="en-US" sz="1600" dirty="0">
+                <a:latin typeface="Roboto" panose="02000000000000000000" pitchFamily="2" charset="0"/>
+                <a:ea typeface="Roboto" panose="02000000000000000000" pitchFamily="2" charset="0"/>
+              </a:rPr>
+              <a:t>[1] </a:t>
+            </a:r>
+            <a:r>
+              <a:rPr lang="en-US" sz="2800" dirty="0">
+                <a:latin typeface="Roboto" panose="02000000000000000000" pitchFamily="2" charset="0"/>
+                <a:ea typeface="Roboto" panose="02000000000000000000" pitchFamily="2" charset="0"/>
+              </a:rPr>
+              <a:t>. </a:t>
             </a:r>
             <a:endParaRPr lang="en-US" sz="2800" dirty="0">
               <a:solidFill>
@@ -17640,7 +17654,21 @@
                 <a:latin typeface="Roboto" panose="02000000000000000000" pitchFamily="2" charset="0"/>
                 <a:ea typeface="Roboto" panose="02000000000000000000" pitchFamily="2" charset="0"/>
               </a:rPr>
-              <a:t>5 datasets:</a:t>
+              <a:t>5 datasets </a:t>
+            </a:r>
+            <a:r>
+              <a:rPr lang="nl-BE" sz="1600" dirty="0">
+                <a:latin typeface="Roboto" panose="02000000000000000000" pitchFamily="2" charset="0"/>
+                <a:ea typeface="Roboto" panose="02000000000000000000" pitchFamily="2" charset="0"/>
+              </a:rPr>
+              <a:t>[2-7,13] </a:t>
+            </a:r>
+            <a:r>
+              <a:rPr lang="nl-BE" sz="2800" dirty="0">
+                <a:latin typeface="Roboto" panose="02000000000000000000" pitchFamily="2" charset="0"/>
+                <a:ea typeface="Roboto" panose="02000000000000000000" pitchFamily="2" charset="0"/>
+              </a:rPr>
+              <a:t>:</a:t>
             </a:r>
           </a:p>
           <a:p>
@@ -17857,15 +17885,525 @@
         </p:nvSpPr>
         <p:spPr>
           <a:xfrm>
-            <a:off x="19581703" y="9539061"/>
-            <a:ext cx="9054041" cy="493538"/>
+            <a:off x="19563250" y="9436065"/>
+            <a:ext cx="9054041" cy="5516259"/>
           </a:xfrm>
         </p:spPr>
         <p:txBody>
           <a:bodyPr/>
           <a:lstStyle/>
           <a:p>
-            <a:endParaRPr lang="en-GB" dirty="0"/>
+            <a:r>
+              <a:rPr lang="en-GB" sz="1100" dirty="0"/>
+              <a:t>[1]Bearman, A., </a:t>
+            </a:r>
+            <a:r>
+              <a:rPr lang="en-GB" sz="1100" dirty="0" err="1"/>
+              <a:t>Russakovsky</a:t>
+            </a:r>
+            <a:r>
+              <a:rPr lang="en-GB" sz="1100" dirty="0"/>
+              <a:t>, O., Ferrari, V., &amp; Fei-Fei, L. (2015, </a:t>
+            </a:r>
+            <a:r>
+              <a:rPr lang="en-GB" sz="1100" dirty="0" err="1"/>
+              <a:t>jun</a:t>
+            </a:r>
+            <a:r>
+              <a:rPr lang="en-GB" sz="1100" dirty="0"/>
+              <a:t>). </a:t>
+            </a:r>
+            <a:r>
+              <a:rPr lang="en-GB" sz="1100" dirty="0" err="1"/>
+              <a:t>Whatś</a:t>
+            </a:r>
+            <a:r>
+              <a:rPr lang="en-GB" sz="1100" dirty="0"/>
+              <a:t> the Point: Semantic Segmentation with Point Supervision. Retrieved from http://arxiv.org/abs/1506.02106</a:t>
+            </a:r>
+          </a:p>
+          <a:p>
+            <a:r>
+              <a:rPr lang="en-GB" sz="1100" dirty="0"/>
+              <a:t>[2]</a:t>
+            </a:r>
+            <a:r>
+              <a:rPr lang="en-GB" sz="1100" dirty="0" err="1"/>
+              <a:t>Burian</a:t>
+            </a:r>
+            <a:r>
+              <a:rPr lang="en-GB" sz="1100" dirty="0"/>
+              <a:t>, E., </a:t>
+            </a:r>
+            <a:r>
+              <a:rPr lang="en-GB" sz="1100" dirty="0" err="1"/>
+              <a:t>Rohrmeier</a:t>
+            </a:r>
+            <a:r>
+              <a:rPr lang="en-GB" sz="1100" dirty="0"/>
+              <a:t>, A., </a:t>
+            </a:r>
+            <a:r>
+              <a:rPr lang="en-GB" sz="1100" dirty="0" err="1"/>
+              <a:t>Schlaeger</a:t>
+            </a:r>
+            <a:r>
+              <a:rPr lang="en-GB" sz="1100" dirty="0"/>
+              <a:t>, S., </a:t>
+            </a:r>
+            <a:r>
+              <a:rPr lang="en-GB" sz="1100" dirty="0" err="1"/>
+              <a:t>Dieckmeyer</a:t>
+            </a:r>
+            <a:r>
+              <a:rPr lang="en-GB" sz="1100" dirty="0"/>
+              <a:t>, M., </a:t>
+            </a:r>
+            <a:r>
+              <a:rPr lang="en-GB" sz="1100" dirty="0" err="1"/>
+              <a:t>Diefenbach</a:t>
+            </a:r>
+            <a:r>
+              <a:rPr lang="en-GB" sz="1100" dirty="0"/>
+              <a:t>, M., </a:t>
+            </a:r>
+            <a:r>
+              <a:rPr lang="en-GB" sz="1100" dirty="0" err="1"/>
+              <a:t>Syväri</a:t>
+            </a:r>
+            <a:r>
+              <a:rPr lang="en-GB" sz="1100" dirty="0"/>
+              <a:t>, J., . . . Baum, T. (2019, 04). Lumbar muscle and vertebral bodies segmentation of chemical shift encoding-based water-fat MRI: The reference database </a:t>
+            </a:r>
+            <a:r>
+              <a:rPr lang="en-GB" sz="1100" dirty="0" err="1"/>
+              <a:t>MyoSegmenTUM</a:t>
+            </a:r>
+            <a:r>
+              <a:rPr lang="en-GB" sz="1100" dirty="0"/>
+              <a:t> spine. BMC Musculoskeletal Disorders, 20. doi:10.1186/s12891-019-2528-x</a:t>
+            </a:r>
+          </a:p>
+          <a:p>
+            <a:r>
+              <a:rPr lang="en-GB" sz="1100" dirty="0"/>
+              <a:t>[3]Chu, C., </a:t>
+            </a:r>
+            <a:r>
+              <a:rPr lang="en-GB" sz="1100" dirty="0" err="1"/>
+              <a:t>Belavý</a:t>
+            </a:r>
+            <a:r>
+              <a:rPr lang="en-GB" sz="1100" dirty="0"/>
+              <a:t>, D. L., </a:t>
+            </a:r>
+            <a:r>
+              <a:rPr lang="en-GB" sz="1100" dirty="0" err="1"/>
+              <a:t>Armbrecht</a:t>
+            </a:r>
+            <a:r>
+              <a:rPr lang="en-GB" sz="1100" dirty="0"/>
+              <a:t>, G., </a:t>
+            </a:r>
+            <a:r>
+              <a:rPr lang="en-GB" sz="1100" dirty="0" err="1"/>
+              <a:t>Bansmann</a:t>
+            </a:r>
+            <a:r>
+              <a:rPr lang="en-GB" sz="1100" dirty="0"/>
+              <a:t>, M., </a:t>
+            </a:r>
+            <a:r>
+              <a:rPr lang="en-GB" sz="1100" dirty="0" err="1"/>
+              <a:t>Felsenberg</a:t>
+            </a:r>
+            <a:r>
+              <a:rPr lang="en-GB" sz="1100" dirty="0"/>
+              <a:t>, D., &amp; Zheng, G. (2015, 11). Fully Automatic Localization and Segmentation of 3D Vertebral Bodies from CT/MR Images via a Learning-Based Method. PLOS ONE, 10, 1-22. doi:10.1371/journal.pone.0143327</a:t>
+            </a:r>
+          </a:p>
+          <a:p>
+            <a:r>
+              <a:rPr lang="en-GB" sz="1100" dirty="0"/>
+              <a:t>[4]</a:t>
+            </a:r>
+            <a:r>
+              <a:rPr lang="en-GB" sz="1100" dirty="0" err="1"/>
+              <a:t>Glocker</a:t>
+            </a:r>
+            <a:r>
+              <a:rPr lang="en-GB" sz="1100" dirty="0"/>
+              <a:t>, B., </a:t>
+            </a:r>
+            <a:r>
+              <a:rPr lang="en-GB" sz="1100" dirty="0" err="1"/>
+              <a:t>Feulner</a:t>
+            </a:r>
+            <a:r>
+              <a:rPr lang="en-GB" sz="1100" dirty="0"/>
+              <a:t>, J., </a:t>
+            </a:r>
+            <a:r>
+              <a:rPr lang="en-GB" sz="1100" dirty="0" err="1"/>
+              <a:t>Criminisi</a:t>
+            </a:r>
+            <a:r>
+              <a:rPr lang="en-GB" sz="1100" dirty="0"/>
+              <a:t>, A., </a:t>
+            </a:r>
+            <a:r>
+              <a:rPr lang="en-GB" sz="1100" dirty="0" err="1"/>
+              <a:t>Haynor</a:t>
+            </a:r>
+            <a:r>
+              <a:rPr lang="en-GB" sz="1100" dirty="0"/>
+              <a:t>, D. R., &amp; </a:t>
+            </a:r>
+            <a:r>
+              <a:rPr lang="en-GB" sz="1100" dirty="0" err="1"/>
+              <a:t>Konukoglu</a:t>
+            </a:r>
+            <a:r>
+              <a:rPr lang="en-GB" sz="1100" dirty="0"/>
+              <a:t>, E. (n.d.). Automatic Localization and Identification of Vertebrae in Arbitrary Field-of-View CT Scans. Tech. rep.</a:t>
+            </a:r>
+          </a:p>
+          <a:p>
+            <a:r>
+              <a:rPr lang="en-GB" sz="1100" dirty="0"/>
+              <a:t>[5]</a:t>
+            </a:r>
+            <a:r>
+              <a:rPr lang="en-GB" sz="1100" dirty="0" err="1"/>
+              <a:t>Glocker</a:t>
+            </a:r>
+            <a:r>
+              <a:rPr lang="en-GB" sz="1100" dirty="0"/>
+              <a:t>, B., </a:t>
+            </a:r>
+            <a:r>
+              <a:rPr lang="en-GB" sz="1100" dirty="0" err="1"/>
+              <a:t>Zikic</a:t>
+            </a:r>
+            <a:r>
+              <a:rPr lang="en-GB" sz="1100" dirty="0"/>
+              <a:t>, D., </a:t>
+            </a:r>
+            <a:r>
+              <a:rPr lang="en-GB" sz="1100" dirty="0" err="1"/>
+              <a:t>Konukoglu</a:t>
+            </a:r>
+            <a:r>
+              <a:rPr lang="en-GB" sz="1100" dirty="0"/>
+              <a:t>, E., </a:t>
+            </a:r>
+            <a:r>
+              <a:rPr lang="en-GB" sz="1100" dirty="0" err="1"/>
+              <a:t>Haynor</a:t>
+            </a:r>
+            <a:r>
+              <a:rPr lang="en-GB" sz="1100" dirty="0"/>
+              <a:t>, D. R., &amp; </a:t>
+            </a:r>
+            <a:r>
+              <a:rPr lang="en-GB" sz="1100" dirty="0" err="1"/>
+              <a:t>Criminisi</a:t>
+            </a:r>
+            <a:r>
+              <a:rPr lang="en-GB" sz="1100" dirty="0"/>
+              <a:t>, A. (n.d.). Vertebrae Localization in Pathological Spine CT via Dense Classification from Sparse Annotations. Tech. rep.</a:t>
+            </a:r>
+          </a:p>
+          <a:p>
+            <a:r>
+              <a:rPr lang="en-GB" sz="1100" dirty="0"/>
+              <a:t>[6]</a:t>
+            </a:r>
+            <a:r>
+              <a:rPr lang="en-GB" sz="1100" dirty="0" err="1"/>
+              <a:t>Ibragimov</a:t>
+            </a:r>
+            <a:r>
+              <a:rPr lang="en-GB" sz="1100" dirty="0"/>
+              <a:t>, B., </a:t>
+            </a:r>
+            <a:r>
+              <a:rPr lang="en-GB" sz="1100" dirty="0" err="1"/>
+              <a:t>Likar</a:t>
+            </a:r>
+            <a:r>
+              <a:rPr lang="en-GB" sz="1100" dirty="0"/>
+              <a:t>, B., </a:t>
+            </a:r>
+            <a:r>
+              <a:rPr lang="en-GB" sz="1100" dirty="0" err="1"/>
+              <a:t>Pernuš</a:t>
+            </a:r>
+            <a:r>
+              <a:rPr lang="en-GB" sz="1100" dirty="0"/>
+              <a:t>, F., &amp; </a:t>
+            </a:r>
+            <a:r>
+              <a:rPr lang="en-GB" sz="1100" dirty="0" err="1"/>
+              <a:t>Vrtovec</a:t>
+            </a:r>
+            <a:r>
+              <a:rPr lang="en-GB" sz="1100" dirty="0"/>
+              <a:t>, T. (2014, April). Shape Representation for Efficient Landmark-Based Segmentation in 3-D. IEEE Transactions on Medical Imaging, 33, 861-874. doi:10.1109/TMI.2013.2296976</a:t>
+            </a:r>
+          </a:p>
+          <a:p>
+            <a:r>
+              <a:rPr lang="en-GB" sz="1100" dirty="0"/>
+              <a:t>[7]</a:t>
+            </a:r>
+            <a:r>
+              <a:rPr lang="en-GB" sz="1100" dirty="0" err="1"/>
+              <a:t>Korez</a:t>
+            </a:r>
+            <a:r>
+              <a:rPr lang="en-GB" sz="1100" dirty="0"/>
+              <a:t>, R., </a:t>
+            </a:r>
+            <a:r>
+              <a:rPr lang="en-GB" sz="1100" dirty="0" err="1"/>
+              <a:t>Ibragimov</a:t>
+            </a:r>
+            <a:r>
+              <a:rPr lang="en-GB" sz="1100" dirty="0"/>
+              <a:t>, B., </a:t>
+            </a:r>
+            <a:r>
+              <a:rPr lang="en-GB" sz="1100" dirty="0" err="1"/>
+              <a:t>Likar</a:t>
+            </a:r>
+            <a:r>
+              <a:rPr lang="en-GB" sz="1100" dirty="0"/>
+              <a:t>, B., </a:t>
+            </a:r>
+            <a:r>
+              <a:rPr lang="en-GB" sz="1100" dirty="0" err="1"/>
+              <a:t>Pernuš</a:t>
+            </a:r>
+            <a:r>
+              <a:rPr lang="en-GB" sz="1100" dirty="0"/>
+              <a:t>, F., &amp; </a:t>
+            </a:r>
+            <a:r>
+              <a:rPr lang="en-GB" sz="1100" dirty="0" err="1"/>
+              <a:t>Vrtovec</a:t>
+            </a:r>
+            <a:r>
+              <a:rPr lang="en-GB" sz="1100" dirty="0"/>
+              <a:t>, T. (2015, Aug). A Framework for Automated Spine and Vertebrae Interpolation-Based Detection and Model-Based Segmentation. IEEE Transactions on Medical Imaging, 34, 1649-1662. doi:10.1109/TMI.2015.2389334</a:t>
+            </a:r>
+          </a:p>
+          <a:p>
+            <a:r>
+              <a:rPr lang="en-GB" sz="1100" dirty="0"/>
+              <a:t>[8]</a:t>
+            </a:r>
+            <a:r>
+              <a:rPr lang="en-GB" sz="1100" dirty="0" err="1"/>
+              <a:t>Laradji</a:t>
+            </a:r>
+            <a:r>
+              <a:rPr lang="en-GB" sz="1100" dirty="0"/>
+              <a:t>, I. H., </a:t>
+            </a:r>
+            <a:r>
+              <a:rPr lang="en-GB" sz="1100" dirty="0" err="1"/>
+              <a:t>Rostamzadeh</a:t>
+            </a:r>
+            <a:r>
+              <a:rPr lang="en-GB" sz="1100" dirty="0"/>
+              <a:t>, N., Pinheiro, P. O., Vazquez, D., &amp; Schmidt, M. (2019, </a:t>
+            </a:r>
+            <a:r>
+              <a:rPr lang="en-GB" sz="1100" dirty="0" err="1"/>
+              <a:t>jun</a:t>
+            </a:r>
+            <a:r>
+              <a:rPr lang="en-GB" sz="1100" dirty="0"/>
+              <a:t>). Instance Segmentation with Point Supervision. Retrieved from http://arxiv.org/abs/1906.06392</a:t>
+            </a:r>
+          </a:p>
+          <a:p>
+            <a:r>
+              <a:rPr lang="en-GB" sz="1100" dirty="0"/>
+              <a:t>[9]</a:t>
+            </a:r>
+            <a:r>
+              <a:rPr lang="en-GB" sz="1100" dirty="0" err="1"/>
+              <a:t>Laradji</a:t>
+            </a:r>
+            <a:r>
+              <a:rPr lang="en-GB" sz="1100" dirty="0"/>
+              <a:t>, I. H., </a:t>
+            </a:r>
+            <a:r>
+              <a:rPr lang="en-GB" sz="1100" dirty="0" err="1"/>
+              <a:t>Rostamzadeh</a:t>
+            </a:r>
+            <a:r>
+              <a:rPr lang="en-GB" sz="1100" dirty="0"/>
+              <a:t>, N., Pinheiro, P. O., Vazquez, D., &amp; Schmidt, M. (2020). Proposal-Based Instance Segmentation With Point Supervision. 2126-2130. doi:10.1109/icip40778.2020.9190782</a:t>
+            </a:r>
+          </a:p>
+          <a:p>
+            <a:r>
+              <a:rPr lang="en-GB" sz="1100" dirty="0"/>
+              <a:t>[10]</a:t>
+            </a:r>
+            <a:r>
+              <a:rPr lang="en-GB" sz="1100" dirty="0" err="1"/>
+              <a:t>Laradji</a:t>
+            </a:r>
+            <a:r>
+              <a:rPr lang="en-GB" sz="1100" dirty="0"/>
+              <a:t>, I. H., Vazquez, D., &amp; Schmidt, M. (2019, </a:t>
+            </a:r>
+            <a:r>
+              <a:rPr lang="en-GB" sz="1100" dirty="0" err="1"/>
+              <a:t>jul</a:t>
+            </a:r>
+            <a:r>
+              <a:rPr lang="en-GB" sz="1100" dirty="0"/>
+              <a:t>). Where are the Masks: Instance Segmentation with Image-level Supervision. Retrieved from http://arxiv.org/abs/1907.01430</a:t>
+            </a:r>
+          </a:p>
+          <a:p>
+            <a:r>
+              <a:rPr lang="en-GB" sz="1100" dirty="0"/>
+              <a:t>[11]</a:t>
+            </a:r>
+            <a:r>
+              <a:rPr lang="en-GB" sz="1100" dirty="0" err="1"/>
+              <a:t>Laradji</a:t>
+            </a:r>
+            <a:r>
+              <a:rPr lang="en-GB" sz="1100" dirty="0"/>
+              <a:t>, I., Rodriguez, P., </a:t>
+            </a:r>
+            <a:r>
+              <a:rPr lang="en-GB" sz="1100" dirty="0" err="1"/>
+              <a:t>Mañas</a:t>
+            </a:r>
+            <a:r>
+              <a:rPr lang="en-GB" sz="1100" dirty="0"/>
+              <a:t>, O., </a:t>
+            </a:r>
+            <a:r>
+              <a:rPr lang="en-GB" sz="1100" dirty="0" err="1"/>
+              <a:t>Lensink</a:t>
+            </a:r>
+            <a:r>
+              <a:rPr lang="en-GB" sz="1100" dirty="0"/>
+              <a:t>, K., Law, M., Kurzman, L., . . . </a:t>
+            </a:r>
+            <a:r>
+              <a:rPr lang="en-GB" sz="1100" dirty="0" err="1"/>
+              <a:t>Nowrouzezahrai</a:t>
+            </a:r>
+            <a:r>
+              <a:rPr lang="en-GB" sz="1100" dirty="0"/>
+              <a:t>, D. (2020, </a:t>
+            </a:r>
+            <a:r>
+              <a:rPr lang="en-GB" sz="1100" dirty="0" err="1"/>
+              <a:t>jul</a:t>
+            </a:r>
+            <a:r>
+              <a:rPr lang="en-GB" sz="1100" dirty="0"/>
+              <a:t>). A Weakly Supervised Consistency-based Learning Method for COVID-19 Segmentation in CT Images. Retrieved from http://arxiv.org/abs/2007.02180</a:t>
+            </a:r>
+          </a:p>
+          <a:p>
+            <a:r>
+              <a:rPr lang="en-GB" sz="1100" dirty="0"/>
+              <a:t>[12]</a:t>
+            </a:r>
+            <a:r>
+              <a:rPr lang="en-GB" sz="1100" dirty="0" err="1"/>
+              <a:t>Lessmann</a:t>
+            </a:r>
+            <a:r>
+              <a:rPr lang="en-GB" sz="1100" dirty="0"/>
+              <a:t>, N., van </a:t>
+            </a:r>
+            <a:r>
+              <a:rPr lang="en-GB" sz="1100" dirty="0" err="1"/>
+              <a:t>Ginneken</a:t>
+            </a:r>
+            <a:r>
+              <a:rPr lang="en-GB" sz="1100" dirty="0"/>
+              <a:t>, B., de Jong and </a:t>
+            </a:r>
+            <a:r>
+              <a:rPr lang="en-GB" sz="1100" dirty="0" err="1"/>
+              <a:t>Pim</a:t>
+            </a:r>
+            <a:r>
+              <a:rPr lang="en-GB" sz="1100" dirty="0"/>
+              <a:t>, A., &amp; </a:t>
+            </a:r>
+            <a:r>
+              <a:rPr lang="en-GB" sz="1100" dirty="0" err="1"/>
+              <a:t>Išgum</a:t>
+            </a:r>
+            <a:r>
+              <a:rPr lang="en-GB" sz="1100" dirty="0"/>
+              <a:t>, I. (2018, </a:t>
+            </a:r>
+            <a:r>
+              <a:rPr lang="en-GB" sz="1100" dirty="0" err="1"/>
+              <a:t>apr</a:t>
+            </a:r>
+            <a:r>
+              <a:rPr lang="en-GB" sz="1100" dirty="0"/>
+              <a:t>). Iterative fully convolutional neural networks for automatic vertebra segmentation and identification. doi:10.1016/j.media.2019.02.005</a:t>
+            </a:r>
+          </a:p>
+          <a:p>
+            <a:r>
+              <a:rPr lang="en-GB" sz="1100" dirty="0"/>
+              <a:t>[13]</a:t>
+            </a:r>
+            <a:r>
+              <a:rPr lang="en-GB" sz="1100" dirty="0" err="1"/>
+              <a:t>Zukić</a:t>
+            </a:r>
+            <a:r>
+              <a:rPr lang="en-GB" sz="1100" dirty="0"/>
+              <a:t>, D., </a:t>
+            </a:r>
+            <a:r>
+              <a:rPr lang="en-GB" sz="1100" dirty="0" err="1"/>
+              <a:t>Vlasák</a:t>
+            </a:r>
+            <a:r>
+              <a:rPr lang="en-GB" sz="1100" dirty="0"/>
+              <a:t>, A., Egger, J., </a:t>
+            </a:r>
+            <a:r>
+              <a:rPr lang="en-GB" sz="1100" dirty="0" err="1"/>
+              <a:t>Hořínek</a:t>
+            </a:r>
+            <a:r>
+              <a:rPr lang="en-GB" sz="1100" dirty="0"/>
+              <a:t>, D., </a:t>
+            </a:r>
+            <a:r>
+              <a:rPr lang="en-GB" sz="1100" dirty="0" err="1"/>
+              <a:t>Nimsky</a:t>
+            </a:r>
+            <a:r>
+              <a:rPr lang="en-GB" sz="1100" dirty="0"/>
+              <a:t>, C., &amp; Kolb, A. (2014, 03). Robust Detection and Segmentation for Diagnosis of Vertebral Diseases Using Routine MR Images. Computer Graphics Forum, 33. doi:10.1111/cgf.12343</a:t>
+            </a:r>
+          </a:p>
+          <a:p>
+            <a:endParaRPr lang="en-GB" sz="1600" dirty="0"/>
           </a:p>
         </p:txBody>
       </p:sp>
@@ -17887,22 +18425,23 @@
         </p:nvSpPr>
         <p:spPr>
           <a:xfrm>
-            <a:off x="19578705" y="14130821"/>
-            <a:ext cx="9050686" cy="597961"/>
+            <a:off x="19603511" y="14467134"/>
+            <a:ext cx="9050686" cy="382517"/>
           </a:xfrm>
         </p:spPr>
         <p:txBody>
           <a:bodyPr/>
           <a:lstStyle/>
           <a:p>
-            <a:r>
-              <a:rPr lang="nl-BE" sz="3200" b="0" u="none" dirty="0" err="1">
+            <a:pPr algn="l"/>
+            <a:r>
+              <a:rPr lang="nl-BE" sz="1800" b="0" u="none" dirty="0" err="1">
                 <a:latin typeface="Roboto Black" panose="02000000000000000000" pitchFamily="2" charset="0"/>
                 <a:ea typeface="Roboto Black" panose="02000000000000000000" pitchFamily="2" charset="0"/>
               </a:rPr>
               <a:t>Aknowledgement</a:t>
             </a:r>
-            <a:endParaRPr lang="en-GB" sz="3200" b="0" u="none" dirty="0">
+            <a:endParaRPr lang="en-GB" sz="1800" b="0" u="none" dirty="0">
               <a:latin typeface="Roboto Black" panose="02000000000000000000" pitchFamily="2" charset="0"/>
               <a:ea typeface="Roboto Black" panose="02000000000000000000" pitchFamily="2" charset="0"/>
             </a:endParaRPr>
@@ -17927,7 +18466,7 @@
         </p:nvSpPr>
         <p:spPr>
           <a:xfrm>
-            <a:off x="19578706" y="14666072"/>
+            <a:off x="19563250" y="14805599"/>
             <a:ext cx="9054041" cy="1150192"/>
           </a:xfrm>
         </p:spPr>
@@ -20012,7 +20551,7 @@
         <p:spPr>
           <a:xfrm>
             <a:off x="19603511" y="4302419"/>
-            <a:ext cx="9047690" cy="4486490"/>
+            <a:ext cx="9047690" cy="5003554"/>
           </a:xfrm>
           <a:prstGeom prst="rect">
             <a:avLst/>
@@ -20529,6 +21068,71 @@
                 <a:ea typeface="Roboto" panose="02000000000000000000" pitchFamily="2" charset="0"/>
               </a:rPr>
               <a:t> memory</a:t>
+            </a:r>
+          </a:p>
+          <a:p>
+            <a:r>
+              <a:rPr lang="nl-BE" sz="2800" dirty="0">
+                <a:latin typeface="Roboto" panose="02000000000000000000" pitchFamily="2" charset="0"/>
+                <a:ea typeface="Roboto" panose="02000000000000000000" pitchFamily="2" charset="0"/>
+              </a:rPr>
+              <a:t>Train best model </a:t>
+            </a:r>
+            <a:r>
+              <a:rPr lang="nl-BE" sz="2800" dirty="0" err="1">
+                <a:latin typeface="Roboto" panose="02000000000000000000" pitchFamily="2" charset="0"/>
+                <a:ea typeface="Roboto" panose="02000000000000000000" pitchFamily="2" charset="0"/>
+              </a:rPr>
+              <a:t>with</a:t>
+            </a:r>
+            <a:r>
+              <a:rPr lang="nl-BE" sz="2800" dirty="0">
+                <a:latin typeface="Roboto" panose="02000000000000000000" pitchFamily="2" charset="0"/>
+                <a:ea typeface="Roboto" panose="02000000000000000000" pitchFamily="2" charset="0"/>
+              </a:rPr>
+              <a:t> UW data </a:t>
+            </a:r>
+            <a:r>
+              <a:rPr lang="nl-BE" sz="2800" dirty="0" err="1">
+                <a:latin typeface="Roboto" panose="02000000000000000000" pitchFamily="2" charset="0"/>
+                <a:ea typeface="Roboto" panose="02000000000000000000" pitchFamily="2" charset="0"/>
+              </a:rPr>
+              <a:t>and</a:t>
+            </a:r>
+            <a:r>
+              <a:rPr lang="nl-BE" sz="2800" dirty="0">
+                <a:latin typeface="Roboto" panose="02000000000000000000" pitchFamily="2" charset="0"/>
+                <a:ea typeface="Roboto" panose="02000000000000000000" pitchFamily="2" charset="0"/>
+              </a:rPr>
+              <a:t> </a:t>
+            </a:r>
+            <a:r>
+              <a:rPr lang="nl-BE" sz="2800" dirty="0" err="1">
+                <a:latin typeface="Roboto" panose="02000000000000000000" pitchFamily="2" charset="0"/>
+                <a:ea typeface="Roboto" panose="02000000000000000000" pitchFamily="2" charset="0"/>
+              </a:rPr>
+              <a:t>evaluate</a:t>
+            </a:r>
+            <a:r>
+              <a:rPr lang="nl-BE" sz="2800" dirty="0">
+                <a:latin typeface="Roboto" panose="02000000000000000000" pitchFamily="2" charset="0"/>
+                <a:ea typeface="Roboto" panose="02000000000000000000" pitchFamily="2" charset="0"/>
+              </a:rPr>
+              <a:t> </a:t>
+            </a:r>
+            <a:r>
+              <a:rPr lang="nl-BE" sz="2800" dirty="0" err="1">
+                <a:latin typeface="Roboto" panose="02000000000000000000" pitchFamily="2" charset="0"/>
+                <a:ea typeface="Roboto" panose="02000000000000000000" pitchFamily="2" charset="0"/>
+              </a:rPr>
+              <a:t>again</a:t>
+            </a:r>
+            <a:r>
+              <a:rPr lang="nl-BE" sz="2800" dirty="0">
+                <a:latin typeface="Roboto" panose="02000000000000000000" pitchFamily="2" charset="0"/>
+                <a:ea typeface="Roboto" panose="02000000000000000000" pitchFamily="2" charset="0"/>
+              </a:rPr>
+              <a:t>.</a:t>
             </a:r>
             <a:endParaRPr lang="en-GB" sz="2800" dirty="0">
               <a:latin typeface="Roboto" panose="02000000000000000000" pitchFamily="2" charset="0"/>
@@ -20800,6 +21404,20 @@
                 <a:latin typeface="Roboto" panose="02000000000000000000" pitchFamily="2" charset="0"/>
                 <a:ea typeface="Roboto" panose="02000000000000000000" pitchFamily="2" charset="0"/>
               </a:rPr>
+              <a:t> </a:t>
+            </a:r>
+            <a:r>
+              <a:rPr lang="nl-BE" sz="1600" dirty="0">
+                <a:latin typeface="Roboto" panose="02000000000000000000" pitchFamily="2" charset="0"/>
+                <a:ea typeface="Roboto" panose="02000000000000000000" pitchFamily="2" charset="0"/>
+              </a:rPr>
+              <a:t>[12] </a:t>
+            </a:r>
+            <a:r>
+              <a:rPr lang="nl-BE" sz="2800" dirty="0">
+                <a:latin typeface="Roboto" panose="02000000000000000000" pitchFamily="2" charset="0"/>
+                <a:ea typeface="Roboto" panose="02000000000000000000" pitchFamily="2" charset="0"/>
+              </a:rPr>
               <a:t>:</a:t>
             </a:r>
           </a:p>
@@ -20822,11 +21440,25 @@
               <a:buChar char="•"/>
             </a:pPr>
             <a:r>
+              <a:rPr lang="nl-BE" sz="2800" dirty="0">
+                <a:latin typeface="Roboto" panose="02000000000000000000" pitchFamily="2" charset="0"/>
+                <a:ea typeface="Roboto" panose="02000000000000000000" pitchFamily="2" charset="0"/>
+              </a:rPr>
+              <a:t>C</a:t>
+            </a:r>
+            <a:r>
+              <a:rPr lang="en-GB" sz="2800" dirty="0" err="1">
+                <a:latin typeface="Roboto" panose="02000000000000000000" pitchFamily="2" charset="0"/>
+                <a:ea typeface="Roboto" panose="02000000000000000000" pitchFamily="2" charset="0"/>
+              </a:rPr>
+              <a:t>omplicated</a:t>
+            </a:r>
+            <a:r>
               <a:rPr lang="en-GB" sz="2800" dirty="0">
                 <a:latin typeface="Roboto" panose="02000000000000000000" pitchFamily="2" charset="0"/>
                 <a:ea typeface="Roboto" panose="02000000000000000000" pitchFamily="2" charset="0"/>
               </a:rPr>
-              <a:t>More complicated inference algorithm</a:t>
+              <a:t> inference algorithm</a:t>
             </a:r>
           </a:p>
         </p:txBody>
@@ -21056,12 +21688,16 @@
               <a:t>loss</a:t>
             </a:r>
             <a:r>
-              <a:rPr lang="nl-BE" sz="2800" dirty="0">
+              <a:rPr lang="nl-BE" sz="1600" dirty="0">
                 <a:latin typeface="Roboto" panose="02000000000000000000" pitchFamily="2" charset="0"/>
                 <a:ea typeface="Roboto" panose="02000000000000000000" pitchFamily="2" charset="0"/>
               </a:rPr>
-              <a:t> </a:t>
-            </a:r>
+              <a:t>[9] </a:t>
+            </a:r>
+            <a:endParaRPr lang="nl-BE" sz="2800" dirty="0">
+              <a:latin typeface="Roboto" panose="02000000000000000000" pitchFamily="2" charset="0"/>
+              <a:ea typeface="Roboto" panose="02000000000000000000" pitchFamily="2" charset="0"/>
+            </a:endParaRPr>
           </a:p>
           <a:p>
             <a:endParaRPr lang="nl-BE" sz="2800" dirty="0">

</xml_diff>